<commit_message>
ppt pour diagram et cr du stm32
</commit_message>
<xml_diff>
--- a/diagramme/exemple diagramme exo cours/RTOS PRESENTATION.pptx
+++ b/diagramme/exemple diagramme exo cours/RTOS PRESENTATION.pptx
@@ -259,7 +259,7 @@
           <a:p>
             <a:fld id="{B142896C-4BAD-4D18-8B19-A6B89DC5E612}" type="datetimeFigureOut">
               <a:rPr lang="fr-FR" smtClean="0"/>
-              <a:t>03/12/2023</a:t>
+              <a:t>22/07/2024</a:t>
             </a:fld>
             <a:endParaRPr lang="fr-FR"/>
           </a:p>
@@ -457,7 +457,7 @@
           <a:p>
             <a:fld id="{B142896C-4BAD-4D18-8B19-A6B89DC5E612}" type="datetimeFigureOut">
               <a:rPr lang="fr-FR" smtClean="0"/>
-              <a:t>03/12/2023</a:t>
+              <a:t>22/07/2024</a:t>
             </a:fld>
             <a:endParaRPr lang="fr-FR"/>
           </a:p>
@@ -665,7 +665,7 @@
           <a:p>
             <a:fld id="{B142896C-4BAD-4D18-8B19-A6B89DC5E612}" type="datetimeFigureOut">
               <a:rPr lang="fr-FR" smtClean="0"/>
-              <a:t>03/12/2023</a:t>
+              <a:t>22/07/2024</a:t>
             </a:fld>
             <a:endParaRPr lang="fr-FR"/>
           </a:p>
@@ -863,7 +863,7 @@
           <a:p>
             <a:fld id="{B142896C-4BAD-4D18-8B19-A6B89DC5E612}" type="datetimeFigureOut">
               <a:rPr lang="fr-FR" smtClean="0"/>
-              <a:t>03/12/2023</a:t>
+              <a:t>22/07/2024</a:t>
             </a:fld>
             <a:endParaRPr lang="fr-FR"/>
           </a:p>
@@ -1138,7 +1138,7 @@
           <a:p>
             <a:fld id="{B142896C-4BAD-4D18-8B19-A6B89DC5E612}" type="datetimeFigureOut">
               <a:rPr lang="fr-FR" smtClean="0"/>
-              <a:t>03/12/2023</a:t>
+              <a:t>22/07/2024</a:t>
             </a:fld>
             <a:endParaRPr lang="fr-FR"/>
           </a:p>
@@ -1403,7 +1403,7 @@
           <a:p>
             <a:fld id="{B142896C-4BAD-4D18-8B19-A6B89DC5E612}" type="datetimeFigureOut">
               <a:rPr lang="fr-FR" smtClean="0"/>
-              <a:t>03/12/2023</a:t>
+              <a:t>22/07/2024</a:t>
             </a:fld>
             <a:endParaRPr lang="fr-FR"/>
           </a:p>
@@ -1815,7 +1815,7 @@
           <a:p>
             <a:fld id="{B142896C-4BAD-4D18-8B19-A6B89DC5E612}" type="datetimeFigureOut">
               <a:rPr lang="fr-FR" smtClean="0"/>
-              <a:t>03/12/2023</a:t>
+              <a:t>22/07/2024</a:t>
             </a:fld>
             <a:endParaRPr lang="fr-FR"/>
           </a:p>
@@ -1956,7 +1956,7 @@
           <a:p>
             <a:fld id="{B142896C-4BAD-4D18-8B19-A6B89DC5E612}" type="datetimeFigureOut">
               <a:rPr lang="fr-FR" smtClean="0"/>
-              <a:t>03/12/2023</a:t>
+              <a:t>22/07/2024</a:t>
             </a:fld>
             <a:endParaRPr lang="fr-FR"/>
           </a:p>
@@ -2069,7 +2069,7 @@
           <a:p>
             <a:fld id="{B142896C-4BAD-4D18-8B19-A6B89DC5E612}" type="datetimeFigureOut">
               <a:rPr lang="fr-FR" smtClean="0"/>
-              <a:t>03/12/2023</a:t>
+              <a:t>22/07/2024</a:t>
             </a:fld>
             <a:endParaRPr lang="fr-FR"/>
           </a:p>
@@ -2380,7 +2380,7 @@
           <a:p>
             <a:fld id="{B142896C-4BAD-4D18-8B19-A6B89DC5E612}" type="datetimeFigureOut">
               <a:rPr lang="fr-FR" smtClean="0"/>
-              <a:t>03/12/2023</a:t>
+              <a:t>22/07/2024</a:t>
             </a:fld>
             <a:endParaRPr lang="fr-FR"/>
           </a:p>
@@ -2668,7 +2668,7 @@
           <a:p>
             <a:fld id="{B142896C-4BAD-4D18-8B19-A6B89DC5E612}" type="datetimeFigureOut">
               <a:rPr lang="fr-FR" smtClean="0"/>
-              <a:t>03/12/2023</a:t>
+              <a:t>22/07/2024</a:t>
             </a:fld>
             <a:endParaRPr lang="fr-FR"/>
           </a:p>
@@ -2909,7 +2909,7 @@
           <a:p>
             <a:fld id="{B142896C-4BAD-4D18-8B19-A6B89DC5E612}" type="datetimeFigureOut">
               <a:rPr lang="fr-FR" smtClean="0"/>
-              <a:t>03/12/2023</a:t>
+              <a:t>22/07/2024</a:t>
             </a:fld>
             <a:endParaRPr lang="fr-FR"/>
           </a:p>

</xml_diff>